<commit_message>
Création du hacheur 4 quadrants - PSIM
</commit_message>
<xml_diff>
--- a/Remise/Remise 2/Presentation2PVcorr2.pptx
+++ b/Remise/Remise 2/Presentation2PVcorr2.pptx
@@ -13620,7 +13620,7 @@
           <a:graphicData uri="http://schemas.openxmlformats.org/presentationml/2006/ole">
             <mc:AlternateContent xmlns:mc="http://schemas.openxmlformats.org/markup-compatibility/2006">
               <mc:Choice xmlns:v="urn:schemas-microsoft-com:vml" Requires="v">
-                <p:oleObj spid="_x0000_s1044" name="Acrobat Document" r:id="rId3" imgW="15087600" imgH="11658600" progId="Acrobat.Document.11">
+                <p:oleObj spid="_x0000_s1045" name="Acrobat Document" r:id="rId3" imgW="15087600" imgH="11658600" progId="Acrobat.Document.11">
                   <p:embed/>
                 </p:oleObj>
               </mc:Choice>
@@ -13733,7 +13733,7 @@
           <a:graphicData uri="http://schemas.openxmlformats.org/presentationml/2006/ole">
             <mc:AlternateContent xmlns:mc="http://schemas.openxmlformats.org/markup-compatibility/2006">
               <mc:Choice xmlns:v="urn:schemas-microsoft-com:vml" Requires="v">
-                <p:oleObj spid="_x0000_s2068" name="Acrobat Document" r:id="rId3" imgW="15087600" imgH="11658600" progId="Acrobat.Document.11">
+                <p:oleObj spid="_x0000_s2069" name="Acrobat Document" r:id="rId3" imgW="15087600" imgH="11658600" progId="Acrobat.Document.11">
                   <p:embed/>
                 </p:oleObj>
               </mc:Choice>
@@ -16341,8 +16341,8 @@
         </p:blipFill>
         <p:spPr bwMode="auto">
           <a:xfrm>
-            <a:off x="994276" y="1767562"/>
-            <a:ext cx="6420653" cy="2383107"/>
+            <a:off x="994276" y="1817666"/>
+            <a:ext cx="6420653" cy="2282899"/>
           </a:xfrm>
           <a:prstGeom prst="rect">
             <a:avLst/>
@@ -16394,8 +16394,8 @@
         </p:blipFill>
         <p:spPr>
           <a:xfrm>
-            <a:off x="994276" y="4233828"/>
-            <a:ext cx="6420653" cy="2483305"/>
+            <a:off x="994276" y="4292101"/>
+            <a:ext cx="6420653" cy="2366758"/>
           </a:xfrm>
           <a:prstGeom prst="rect">
             <a:avLst/>

</xml_diff>

<commit_message>
Oubli du filtre passe-bas
</commit_message>
<xml_diff>
--- a/Remise/Remise 2/Presentation2PVcorr2.pptx
+++ b/Remise/Remise 2/Presentation2PVcorr2.pptx
@@ -13620,7 +13620,7 @@
           <a:graphicData uri="http://schemas.openxmlformats.org/presentationml/2006/ole">
             <mc:AlternateContent xmlns:mc="http://schemas.openxmlformats.org/markup-compatibility/2006">
               <mc:Choice xmlns:v="urn:schemas-microsoft-com:vml" Requires="v">
-                <p:oleObj spid="_x0000_s1045" name="Acrobat Document" r:id="rId3" imgW="15087600" imgH="11658600" progId="Acrobat.Document.11">
+                <p:oleObj spid="_x0000_s1046" name="Acrobat Document" r:id="rId3" imgW="15087600" imgH="11658600" progId="Acrobat.Document.11">
                   <p:embed/>
                 </p:oleObj>
               </mc:Choice>
@@ -13733,7 +13733,7 @@
           <a:graphicData uri="http://schemas.openxmlformats.org/presentationml/2006/ole">
             <mc:AlternateContent xmlns:mc="http://schemas.openxmlformats.org/markup-compatibility/2006">
               <mc:Choice xmlns:v="urn:schemas-microsoft-com:vml" Requires="v">
-                <p:oleObj spid="_x0000_s2069" name="Acrobat Document" r:id="rId3" imgW="15087600" imgH="11658600" progId="Acrobat.Document.11">
+                <p:oleObj spid="_x0000_s2070" name="Acrobat Document" r:id="rId3" imgW="15087600" imgH="11658600" progId="Acrobat.Document.11">
                   <p:embed/>
                 </p:oleObj>
               </mc:Choice>
@@ -14712,15 +14712,7 @@
             </a:r>
             <a:r>
               <a:rPr lang="fr-CA" sz="2000" dirty="0" smtClean="0"/>
-              <a:t>mplanter et simuler indépendamment </a:t>
-            </a:r>
-            <a:r>
-              <a:rPr lang="fr-CA" sz="2000" dirty="0" smtClean="0"/>
-              <a:t>les sous-systèmes </a:t>
-            </a:r>
-            <a:r>
-              <a:rPr lang="fr-CA" sz="2000" dirty="0" smtClean="0"/>
-              <a:t>en boucle ouverte puis en boucle fermée avec régulateurs</a:t>
+              <a:t>mplanter et simuler indépendamment les sous-systèmes en boucle ouverte puis en boucle fermée avec régulateurs</a:t>
             </a:r>
           </a:p>
           <a:p>
@@ -16341,8 +16333,8 @@
         </p:blipFill>
         <p:spPr bwMode="auto">
           <a:xfrm>
-            <a:off x="994276" y="1817666"/>
-            <a:ext cx="6420653" cy="2282899"/>
+            <a:off x="1091558" y="1817666"/>
+            <a:ext cx="6226089" cy="2282899"/>
           </a:xfrm>
           <a:prstGeom prst="rect">
             <a:avLst/>
@@ -16394,8 +16386,8 @@
         </p:blipFill>
         <p:spPr>
           <a:xfrm>
-            <a:off x="994276" y="4292101"/>
-            <a:ext cx="6420653" cy="2366758"/>
+            <a:off x="994276" y="4309437"/>
+            <a:ext cx="6420653" cy="2332085"/>
           </a:xfrm>
           <a:prstGeom prst="rect">
             <a:avLst/>

</xml_diff>

<commit_message>
Correction du francais rapide
</commit_message>
<xml_diff>
--- a/Remise/Remise 2/Presentation2PVcorr2.pptx
+++ b/Remise/Remise 2/Presentation2PVcorr2.pptx
@@ -7540,6 +7540,9 @@
           </p:cNvSpPr>
           <p:nvPr>
             <p:ph type="title"/>
+            <p:custDataLst>
+              <p:tags r:id="rId1"/>
+            </p:custDataLst>
           </p:nvPr>
         </p:nvSpPr>
         <p:spPr>
@@ -7574,10 +7577,14 @@
           <p:cNvPicPr>
             <a:picLocks noChangeAspect="1"/>
           </p:cNvPicPr>
-          <p:nvPr/>
+          <p:nvPr>
+            <p:custDataLst>
+              <p:tags r:id="rId2"/>
+            </p:custDataLst>
+          </p:nvPr>
         </p:nvPicPr>
         <p:blipFill>
-          <a:blip r:embed="rId2"/>
+          <a:blip r:embed="rId5"/>
           <a:stretch>
             <a:fillRect/>
           </a:stretch>
@@ -7596,7 +7603,11 @@
         <p:nvSpPr>
           <p:cNvPr id="7" name="TextBox 6"/>
           <p:cNvSpPr txBox="1"/>
-          <p:nvPr/>
+          <p:nvPr>
+            <p:custDataLst>
+              <p:tags r:id="rId3"/>
+            </p:custDataLst>
+          </p:nvPr>
         </p:nvSpPr>
         <p:spPr>
           <a:xfrm>
@@ -7786,6 +7797,9 @@
           </p:cNvSpPr>
           <p:nvPr>
             <p:ph type="title"/>
+            <p:custDataLst>
+              <p:tags r:id="rId1"/>
+            </p:custDataLst>
           </p:nvPr>
         </p:nvSpPr>
         <p:spPr>
@@ -7824,6 +7838,9 @@
           </p:cNvSpPr>
           <p:nvPr>
             <p:ph idx="1"/>
+            <p:custDataLst>
+              <p:tags r:id="rId2"/>
+            </p:custDataLst>
           </p:nvPr>
         </p:nvSpPr>
         <p:spPr>
@@ -7923,6 +7940,9 @@
           </p:cNvSpPr>
           <p:nvPr>
             <p:ph type="title"/>
+            <p:custDataLst>
+              <p:tags r:id="rId1"/>
+            </p:custDataLst>
           </p:nvPr>
         </p:nvSpPr>
         <p:spPr>
@@ -7957,10 +7977,14 @@
           <p:cNvPicPr>
             <a:picLocks noChangeAspect="1"/>
           </p:cNvPicPr>
-          <p:nvPr/>
+          <p:nvPr>
+            <p:custDataLst>
+              <p:tags r:id="rId2"/>
+            </p:custDataLst>
+          </p:nvPr>
         </p:nvPicPr>
         <p:blipFill>
-          <a:blip r:embed="rId2" cstate="print">
+          <a:blip r:embed="rId4" cstate="print">
             <a:extLst>
               <a:ext uri="{28A0092B-C50C-407E-A947-70E740481C1C}">
                 <a14:useLocalDpi xmlns:a14="http://schemas.microsoft.com/office/drawing/2010/main" val="0"/>
@@ -8026,6 +8050,9 @@
           </p:cNvSpPr>
           <p:nvPr>
             <p:ph type="title"/>
+            <p:custDataLst>
+              <p:tags r:id="rId1"/>
+            </p:custDataLst>
           </p:nvPr>
         </p:nvSpPr>
         <p:spPr/>
@@ -8051,10 +8078,14 @@
           <p:cNvPicPr>
             <a:picLocks noChangeAspect="1"/>
           </p:cNvPicPr>
-          <p:nvPr/>
+          <p:nvPr>
+            <p:custDataLst>
+              <p:tags r:id="rId2"/>
+            </p:custDataLst>
+          </p:nvPr>
         </p:nvPicPr>
         <p:blipFill>
-          <a:blip r:embed="rId2">
+          <a:blip r:embed="rId4">
             <a:extLst>
               <a:ext uri="{28A0092B-C50C-407E-A947-70E740481C1C}">
                 <a14:useLocalDpi xmlns:a14="http://schemas.microsoft.com/office/drawing/2010/main" val="0"/>
@@ -8120,6 +8151,9 @@
           </p:cNvSpPr>
           <p:nvPr>
             <p:ph type="title"/>
+            <p:custDataLst>
+              <p:tags r:id="rId1"/>
+            </p:custDataLst>
           </p:nvPr>
         </p:nvSpPr>
         <p:spPr/>
@@ -8149,10 +8183,14 @@
           <p:cNvPicPr>
             <a:picLocks noChangeAspect="1"/>
           </p:cNvPicPr>
-          <p:nvPr/>
+          <p:nvPr>
+            <p:custDataLst>
+              <p:tags r:id="rId2"/>
+            </p:custDataLst>
+          </p:nvPr>
         </p:nvPicPr>
         <p:blipFill>
-          <a:blip r:embed="rId2">
+          <a:blip r:embed="rId4">
             <a:extLst>
               <a:ext uri="{28A0092B-C50C-407E-A947-70E740481C1C}">
                 <a14:useLocalDpi xmlns:a14="http://schemas.microsoft.com/office/drawing/2010/main" val="0"/>
@@ -8218,6 +8256,9 @@
           </p:cNvSpPr>
           <p:nvPr>
             <p:ph type="title"/>
+            <p:custDataLst>
+              <p:tags r:id="rId1"/>
+            </p:custDataLst>
           </p:nvPr>
         </p:nvSpPr>
         <p:spPr>
@@ -8260,10 +8301,14 @@
           <p:cNvPicPr>
             <a:picLocks noChangeAspect="1"/>
           </p:cNvPicPr>
-          <p:nvPr/>
+          <p:nvPr>
+            <p:custDataLst>
+              <p:tags r:id="rId2"/>
+            </p:custDataLst>
+          </p:nvPr>
         </p:nvPicPr>
         <p:blipFill>
-          <a:blip r:embed="rId2" cstate="print">
+          <a:blip r:embed="rId5" cstate="print">
             <a:extLst>
               <a:ext uri="{28A0092B-C50C-407E-A947-70E740481C1C}">
                 <a14:useLocalDpi xmlns:a14="http://schemas.microsoft.com/office/drawing/2010/main" val="0"/>
@@ -8288,7 +8333,11 @@
         <p:nvSpPr>
           <p:cNvPr id="4" name="Rectangle 3"/>
           <p:cNvSpPr/>
-          <p:nvPr/>
+          <p:nvPr>
+            <p:custDataLst>
+              <p:tags r:id="rId3"/>
+            </p:custDataLst>
+          </p:nvPr>
         </p:nvSpPr>
         <p:spPr>
           <a:xfrm>
@@ -8541,6 +8590,9 @@
           </p:cNvSpPr>
           <p:nvPr>
             <p:ph type="title"/>
+            <p:custDataLst>
+              <p:tags r:id="rId1"/>
+            </p:custDataLst>
           </p:nvPr>
         </p:nvSpPr>
         <p:spPr/>
@@ -8562,10 +8614,14 @@
           <p:cNvPicPr>
             <a:picLocks noChangeAspect="1"/>
           </p:cNvPicPr>
-          <p:nvPr/>
+          <p:nvPr>
+            <p:custDataLst>
+              <p:tags r:id="rId2"/>
+            </p:custDataLst>
+          </p:nvPr>
         </p:nvPicPr>
         <p:blipFill>
-          <a:blip r:embed="rId2">
+          <a:blip r:embed="rId4">
             <a:extLst>
               <a:ext uri="{28A0092B-C50C-407E-A947-70E740481C1C}">
                 <a14:useLocalDpi xmlns:a14="http://schemas.microsoft.com/office/drawing/2010/main" val="0"/>
@@ -8631,6 +8687,9 @@
           </p:cNvSpPr>
           <p:nvPr>
             <p:ph type="title"/>
+            <p:custDataLst>
+              <p:tags r:id="rId1"/>
+            </p:custDataLst>
           </p:nvPr>
         </p:nvSpPr>
         <p:spPr/>
@@ -8664,10 +8723,14 @@
           <p:cNvPicPr>
             <a:picLocks noChangeAspect="1" noChangeArrowheads="1"/>
           </p:cNvPicPr>
-          <p:nvPr/>
+          <p:nvPr>
+            <p:custDataLst>
+              <p:tags r:id="rId2"/>
+            </p:custDataLst>
+          </p:nvPr>
         </p:nvPicPr>
         <p:blipFill>
-          <a:blip r:embed="rId2">
+          <a:blip r:embed="rId4">
             <a:extLst>
               <a:ext uri="{28A0092B-C50C-407E-A947-70E740481C1C}">
                 <a14:useLocalDpi xmlns:a14="http://schemas.microsoft.com/office/drawing/2010/main" val="0"/>
@@ -8757,6 +8820,9 @@
           </p:cNvSpPr>
           <p:nvPr>
             <p:ph type="title"/>
+            <p:custDataLst>
+              <p:tags r:id="rId1"/>
+            </p:custDataLst>
           </p:nvPr>
         </p:nvSpPr>
         <p:spPr/>
@@ -8794,10 +8860,14 @@
           <p:cNvPicPr>
             <a:picLocks noChangeAspect="1" noChangeArrowheads="1"/>
           </p:cNvPicPr>
-          <p:nvPr/>
+          <p:nvPr>
+            <p:custDataLst>
+              <p:tags r:id="rId2"/>
+            </p:custDataLst>
+          </p:nvPr>
         </p:nvPicPr>
         <p:blipFill>
-          <a:blip r:embed="rId2">
+          <a:blip r:embed="rId5">
             <a:extLst>
               <a:ext uri="{28A0092B-C50C-407E-A947-70E740481C1C}">
                 <a14:useLocalDpi xmlns:a14="http://schemas.microsoft.com/office/drawing/2010/main" val="0"/>
@@ -8846,7 +8916,11 @@
         <p:nvSpPr>
           <p:cNvPr id="4" name="Rectangle 3"/>
           <p:cNvSpPr/>
-          <p:nvPr/>
+          <p:nvPr>
+            <p:custDataLst>
+              <p:tags r:id="rId3"/>
+            </p:custDataLst>
+          </p:nvPr>
         </p:nvSpPr>
         <p:spPr>
           <a:xfrm>
@@ -9055,6 +9129,9 @@
           </p:cNvSpPr>
           <p:nvPr>
             <p:ph type="title"/>
+            <p:custDataLst>
+              <p:tags r:id="rId1"/>
+            </p:custDataLst>
           </p:nvPr>
         </p:nvSpPr>
         <p:spPr/>
@@ -9076,10 +9153,14 @@
           <p:cNvPicPr>
             <a:picLocks noChangeAspect="1" noChangeArrowheads="1"/>
           </p:cNvPicPr>
-          <p:nvPr/>
+          <p:nvPr>
+            <p:custDataLst>
+              <p:tags r:id="rId2"/>
+            </p:custDataLst>
+          </p:nvPr>
         </p:nvPicPr>
         <p:blipFill>
-          <a:blip r:embed="rId2">
+          <a:blip r:embed="rId4">
             <a:extLst>
               <a:ext uri="{28A0092B-C50C-407E-A947-70E740481C1C}">
                 <a14:useLocalDpi xmlns:a14="http://schemas.microsoft.com/office/drawing/2010/main" val="0"/>
@@ -9169,6 +9250,9 @@
           </p:cNvSpPr>
           <p:nvPr>
             <p:ph type="title"/>
+            <p:custDataLst>
+              <p:tags r:id="rId1"/>
+            </p:custDataLst>
           </p:nvPr>
         </p:nvSpPr>
         <p:spPr/>
@@ -9192,6 +9276,9 @@
           </p:cNvSpPr>
           <p:nvPr>
             <p:ph idx="1"/>
+            <p:custDataLst>
+              <p:tags r:id="rId2"/>
+            </p:custDataLst>
           </p:nvPr>
         </p:nvSpPr>
         <p:spPr>
@@ -9255,7 +9342,15 @@
           <a:p>
             <a:r>
               <a:rPr lang="fr-CA" dirty="0" smtClean="0"/>
-              <a:t>OPAL-RT est une compagnie spécialisée dans la développement de simulateurs temps réel PC/FPGA</a:t>
+              <a:t>OPAL-RT est une compagnie spécialisée dans </a:t>
+            </a:r>
+            <a:r>
+              <a:rPr lang="fr-CA" dirty="0" smtClean="0"/>
+              <a:t>le </a:t>
+            </a:r>
+            <a:r>
+              <a:rPr lang="fr-CA" dirty="0" smtClean="0"/>
+              <a:t>développement de simulateurs temps réel PC/FPGA</a:t>
             </a:r>
           </a:p>
           <a:p>
@@ -9277,10 +9372,14 @@
           <p:cNvPicPr>
             <a:picLocks noChangeAspect="1" noChangeArrowheads="1"/>
           </p:cNvPicPr>
-          <p:nvPr/>
+          <p:nvPr>
+            <p:custDataLst>
+              <p:tags r:id="rId3"/>
+            </p:custDataLst>
+          </p:nvPr>
         </p:nvPicPr>
         <p:blipFill>
-          <a:blip r:embed="rId2" cstate="print"/>
+          <a:blip r:embed="rId8" cstate="print"/>
           <a:srcRect/>
           <a:stretch>
             <a:fillRect/>
@@ -9309,10 +9408,14 @@
           <p:cNvPicPr>
             <a:picLocks noChangeAspect="1"/>
           </p:cNvPicPr>
-          <p:nvPr/>
+          <p:nvPr>
+            <p:custDataLst>
+              <p:tags r:id="rId4"/>
+            </p:custDataLst>
+          </p:nvPr>
         </p:nvPicPr>
         <p:blipFill>
-          <a:blip r:embed="rId3" cstate="print">
+          <a:blip r:embed="rId9" cstate="print">
             <a:extLst>
               <a:ext uri="{28A0092B-C50C-407E-A947-70E740481C1C}">
                 <a14:useLocalDpi xmlns:a14="http://schemas.microsoft.com/office/drawing/2010/main" val="0"/>
@@ -9363,10 +9466,14 @@
           <p:cNvPicPr>
             <a:picLocks noChangeAspect="1"/>
           </p:cNvPicPr>
-          <p:nvPr/>
+          <p:nvPr>
+            <p:custDataLst>
+              <p:tags r:id="rId5"/>
+            </p:custDataLst>
+          </p:nvPr>
         </p:nvPicPr>
         <p:blipFill>
-          <a:blip r:embed="rId4"/>
+          <a:blip r:embed="rId10"/>
           <a:stretch>
             <a:fillRect/>
           </a:stretch>
@@ -9385,11 +9492,15 @@
         <p:nvSpPr>
           <p:cNvPr id="2" name="TextBox 1"/>
           <p:cNvSpPr txBox="1"/>
-          <p:nvPr/>
+          <p:nvPr>
+            <p:custDataLst>
+              <p:tags r:id="rId6"/>
+            </p:custDataLst>
+          </p:nvPr>
         </p:nvSpPr>
         <p:spPr>
           <a:xfrm>
-            <a:off x="1080959" y="2639750"/>
+            <a:off x="638911" y="2639750"/>
             <a:ext cx="2903359" cy="523220"/>
           </a:xfrm>
           <a:prstGeom prst="rect">
@@ -9456,6 +9567,9 @@
           </p:cNvSpPr>
           <p:nvPr>
             <p:ph type="title"/>
+            <p:custDataLst>
+              <p:tags r:id="rId1"/>
+            </p:custDataLst>
           </p:nvPr>
         </p:nvSpPr>
         <p:spPr/>
@@ -9478,6 +9592,9 @@
             <a:graphicFrameLocks noGrp="1"/>
           </p:cNvGraphicFramePr>
           <p:nvPr>
+            <p:custDataLst>
+              <p:tags r:id="rId2"/>
+            </p:custDataLst>
             <p:extLst/>
           </p:nvPr>
         </p:nvGraphicFramePr>
@@ -10789,6 +10906,9 @@
           </p:cNvSpPr>
           <p:nvPr>
             <p:ph type="title"/>
+            <p:custDataLst>
+              <p:tags r:id="rId1"/>
+            </p:custDataLst>
           </p:nvPr>
         </p:nvSpPr>
         <p:spPr/>
@@ -10823,6 +10943,9 @@
             <a:graphicFrameLocks noGrp="1"/>
           </p:cNvGraphicFramePr>
           <p:nvPr>
+            <p:custDataLst>
+              <p:tags r:id="rId2"/>
+            </p:custDataLst>
             <p:extLst/>
           </p:nvPr>
         </p:nvGraphicFramePr>
@@ -11660,6 +11783,9 @@
           </p:cNvSpPr>
           <p:nvPr>
             <p:ph type="title"/>
+            <p:custDataLst>
+              <p:tags r:id="rId1"/>
+            </p:custDataLst>
           </p:nvPr>
         </p:nvSpPr>
         <p:spPr/>
@@ -11694,6 +11820,9 @@
             <a:graphicFrameLocks noGrp="1"/>
           </p:cNvGraphicFramePr>
           <p:nvPr>
+            <p:custDataLst>
+              <p:tags r:id="rId2"/>
+            </p:custDataLst>
             <p:extLst/>
           </p:nvPr>
         </p:nvGraphicFramePr>
@@ -12329,6 +12458,9 @@
           </p:cNvSpPr>
           <p:nvPr>
             <p:ph type="title"/>
+            <p:custDataLst>
+              <p:tags r:id="rId1"/>
+            </p:custDataLst>
           </p:nvPr>
         </p:nvSpPr>
         <p:spPr/>
@@ -12363,6 +12495,9 @@
             <a:graphicFrameLocks noGrp="1"/>
           </p:cNvGraphicFramePr>
           <p:nvPr>
+            <p:custDataLst>
+              <p:tags r:id="rId2"/>
+            </p:custDataLst>
             <p:extLst/>
           </p:nvPr>
         </p:nvGraphicFramePr>
@@ -12987,6 +13122,9 @@
           </p:cNvSpPr>
           <p:nvPr>
             <p:ph type="title"/>
+            <p:custDataLst>
+              <p:tags r:id="rId1"/>
+            </p:custDataLst>
           </p:nvPr>
         </p:nvSpPr>
         <p:spPr/>
@@ -13021,6 +13159,9 @@
             <a:graphicFrameLocks noGrp="1"/>
           </p:cNvGraphicFramePr>
           <p:nvPr>
+            <p:custDataLst>
+              <p:tags r:id="rId2"/>
+            </p:custDataLst>
             <p:extLst/>
           </p:nvPr>
         </p:nvGraphicFramePr>
@@ -13587,6 +13728,9 @@
           </p:cNvSpPr>
           <p:nvPr>
             <p:ph type="title"/>
+            <p:custDataLst>
+              <p:tags r:id="rId2"/>
+            </p:custDataLst>
           </p:nvPr>
         </p:nvSpPr>
         <p:spPr/>
@@ -13609,6 +13753,9 @@
             <a:graphicFrameLocks noChangeAspect="1"/>
           </p:cNvGraphicFramePr>
           <p:nvPr>
+            <p:custDataLst>
+              <p:tags r:id="rId3"/>
+            </p:custDataLst>
             <p:extLst/>
           </p:nvPr>
         </p:nvGraphicFramePr>
@@ -13620,12 +13767,12 @@
           <a:graphicData uri="http://schemas.openxmlformats.org/presentationml/2006/ole">
             <mc:AlternateContent xmlns:mc="http://schemas.openxmlformats.org/markup-compatibility/2006">
               <mc:Choice xmlns:v="urn:schemas-microsoft-com:vml" Requires="v">
-                <p:oleObj spid="_x0000_s1046" name="Acrobat Document" r:id="rId3" imgW="15087600" imgH="11658600" progId="Acrobat.Document.11">
+                <p:oleObj spid="_x0000_s1047" name="Acrobat Document" r:id="rId5" imgW="15087600" imgH="11658600" progId="Acrobat.Document.11">
                   <p:embed/>
                 </p:oleObj>
               </mc:Choice>
               <mc:Fallback>
-                <p:oleObj name="Acrobat Document" r:id="rId3" imgW="15087600" imgH="11658600" progId="Acrobat.Document.11">
+                <p:oleObj name="Acrobat Document" r:id="rId5" imgW="15087600" imgH="11658600" progId="Acrobat.Document.11">
                   <p:embed/>
                   <p:pic>
                     <p:nvPicPr>
@@ -13634,7 +13781,7 @@
                       <p:nvPr/>
                     </p:nvPicPr>
                     <p:blipFill>
-                      <a:blip r:embed="rId4"/>
+                      <a:blip r:embed="rId6"/>
                       <a:stretch>
                         <a:fillRect/>
                       </a:stretch>
@@ -13700,6 +13847,9 @@
           </p:cNvSpPr>
           <p:nvPr>
             <p:ph type="title"/>
+            <p:custDataLst>
+              <p:tags r:id="rId2"/>
+            </p:custDataLst>
           </p:nvPr>
         </p:nvSpPr>
         <p:spPr/>
@@ -13722,6 +13872,9 @@
             <a:graphicFrameLocks noChangeAspect="1"/>
           </p:cNvGraphicFramePr>
           <p:nvPr>
+            <p:custDataLst>
+              <p:tags r:id="rId3"/>
+            </p:custDataLst>
             <p:extLst/>
           </p:nvPr>
         </p:nvGraphicFramePr>
@@ -13733,12 +13886,12 @@
           <a:graphicData uri="http://schemas.openxmlformats.org/presentationml/2006/ole">
             <mc:AlternateContent xmlns:mc="http://schemas.openxmlformats.org/markup-compatibility/2006">
               <mc:Choice xmlns:v="urn:schemas-microsoft-com:vml" Requires="v">
-                <p:oleObj spid="_x0000_s2070" name="Acrobat Document" r:id="rId3" imgW="15087600" imgH="11658600" progId="Acrobat.Document.11">
+                <p:oleObj spid="_x0000_s2071" name="Acrobat Document" r:id="rId5" imgW="15087600" imgH="11658600" progId="Acrobat.Document.11">
                   <p:embed/>
                 </p:oleObj>
               </mc:Choice>
               <mc:Fallback>
-                <p:oleObj name="Acrobat Document" r:id="rId3" imgW="15087600" imgH="11658600" progId="Acrobat.Document.11">
+                <p:oleObj name="Acrobat Document" r:id="rId5" imgW="15087600" imgH="11658600" progId="Acrobat.Document.11">
                   <p:embed/>
                   <p:pic>
                     <p:nvPicPr>
@@ -13747,7 +13900,7 @@
                       <p:nvPr/>
                     </p:nvPicPr>
                     <p:blipFill>
-                      <a:blip r:embed="rId4"/>
+                      <a:blip r:embed="rId6"/>
                       <a:stretch>
                         <a:fillRect/>
                       </a:stretch>
@@ -13813,6 +13966,9 @@
           </p:cNvSpPr>
           <p:nvPr>
             <p:ph type="title"/>
+            <p:custDataLst>
+              <p:tags r:id="rId1"/>
+            </p:custDataLst>
           </p:nvPr>
         </p:nvSpPr>
         <p:spPr/>
@@ -13834,10 +13990,14 @@
           <p:cNvPicPr>
             <a:picLocks noChangeAspect="1"/>
           </p:cNvPicPr>
-          <p:nvPr/>
+          <p:nvPr>
+            <p:custDataLst>
+              <p:tags r:id="rId2"/>
+            </p:custDataLst>
+          </p:nvPr>
         </p:nvPicPr>
         <p:blipFill>
-          <a:blip r:embed="rId2">
+          <a:blip r:embed="rId4">
             <a:extLst>
               <a:ext uri="{28A0092B-C50C-407E-A947-70E740481C1C}">
                 <a14:useLocalDpi xmlns:a14="http://schemas.microsoft.com/office/drawing/2010/main" val="0"/>
@@ -13903,6 +14063,9 @@
           </p:cNvSpPr>
           <p:nvPr>
             <p:ph type="title"/>
+            <p:custDataLst>
+              <p:tags r:id="rId1"/>
+            </p:custDataLst>
           </p:nvPr>
         </p:nvSpPr>
         <p:spPr/>
@@ -13924,10 +14087,14 @@
           <p:cNvPicPr>
             <a:picLocks noChangeAspect="1"/>
           </p:cNvPicPr>
-          <p:nvPr/>
+          <p:nvPr>
+            <p:custDataLst>
+              <p:tags r:id="rId2"/>
+            </p:custDataLst>
+          </p:nvPr>
         </p:nvPicPr>
         <p:blipFill>
-          <a:blip r:embed="rId2">
+          <a:blip r:embed="rId4">
             <a:extLst>
               <a:ext uri="{28A0092B-C50C-407E-A947-70E740481C1C}">
                 <a14:useLocalDpi xmlns:a14="http://schemas.microsoft.com/office/drawing/2010/main" val="0"/>
@@ -13993,6 +14160,9 @@
           </p:cNvSpPr>
           <p:nvPr>
             <p:ph type="title"/>
+            <p:custDataLst>
+              <p:tags r:id="rId1"/>
+            </p:custDataLst>
           </p:nvPr>
         </p:nvSpPr>
         <p:spPr/>
@@ -14014,10 +14184,14 @@
           <p:cNvPicPr>
             <a:picLocks noChangeAspect="1"/>
           </p:cNvPicPr>
-          <p:nvPr/>
+          <p:nvPr>
+            <p:custDataLst>
+              <p:tags r:id="rId2"/>
+            </p:custDataLst>
+          </p:nvPr>
         </p:nvPicPr>
         <p:blipFill>
-          <a:blip r:embed="rId2">
+          <a:blip r:embed="rId4">
             <a:extLst>
               <a:ext uri="{28A0092B-C50C-407E-A947-70E740481C1C}">
                 <a14:useLocalDpi xmlns:a14="http://schemas.microsoft.com/office/drawing/2010/main" val="0"/>
@@ -14083,6 +14257,9 @@
           </p:cNvSpPr>
           <p:nvPr>
             <p:ph type="title"/>
+            <p:custDataLst>
+              <p:tags r:id="rId1"/>
+            </p:custDataLst>
           </p:nvPr>
         </p:nvSpPr>
         <p:spPr/>
@@ -14110,6 +14287,9 @@
           </p:cNvSpPr>
           <p:nvPr>
             <p:ph idx="1"/>
+            <p:custDataLst>
+              <p:tags r:id="rId2"/>
+            </p:custDataLst>
           </p:nvPr>
         </p:nvSpPr>
         <p:spPr/>
@@ -14245,21 +14425,25 @@
             </a:r>
             <a:r>
               <a:rPr lang="en-US" dirty="0" err="1" smtClean="0"/>
-              <a:t>methodes</a:t>
-            </a:r>
-            <a:r>
-              <a:rPr lang="en-US" dirty="0" smtClean="0"/>
-              <a:t> de simulation </a:t>
-            </a:r>
-            <a:r>
-              <a:rPr lang="en-US" dirty="0" err="1" smtClean="0"/>
-              <a:t>employés</a:t>
+              <a:t>méthodes</a:t>
             </a:r>
             <a:r>
               <a:rPr lang="en-US" dirty="0" smtClean="0"/>
               <a:t> </a:t>
             </a:r>
             <a:r>
+              <a:rPr lang="en-US" dirty="0" smtClean="0"/>
+              <a:t>de simulation </a:t>
+            </a:r>
+            <a:r>
+              <a:rPr lang="en-US" dirty="0" err="1" smtClean="0"/>
+              <a:t>employées</a:t>
+            </a:r>
+            <a:r>
+              <a:rPr lang="en-US" dirty="0" smtClean="0"/>
+              <a:t> </a:t>
+            </a:r>
+            <a:r>
               <a:rPr lang="en-US" dirty="0" err="1" smtClean="0"/>
               <a:t>sur</a:t>
             </a:r>
@@ -14460,7 +14644,15 @@
             </a:r>
             <a:r>
               <a:rPr lang="en-US" dirty="0" smtClean="0"/>
-              <a:t> documentation technique de reference </a:t>
+              <a:t> documentation technique de </a:t>
+            </a:r>
+            <a:r>
+              <a:rPr lang="en-US" dirty="0" err="1" smtClean="0"/>
+              <a:t>référence</a:t>
+            </a:r>
+            <a:r>
+              <a:rPr lang="en-US" dirty="0" smtClean="0"/>
+              <a:t> </a:t>
             </a:r>
             <a:r>
               <a:rPr lang="en-US" dirty="0" err="1" smtClean="0"/>
@@ -14609,6 +14801,9 @@
           </p:cNvSpPr>
           <p:nvPr>
             <p:ph type="title"/>
+            <p:custDataLst>
+              <p:tags r:id="rId1"/>
+            </p:custDataLst>
           </p:nvPr>
         </p:nvSpPr>
         <p:spPr/>
@@ -14636,6 +14831,9 @@
           </p:cNvSpPr>
           <p:nvPr>
             <p:ph idx="1"/>
+            <p:custDataLst>
+              <p:tags r:id="rId2"/>
+            </p:custDataLst>
           </p:nvPr>
         </p:nvSpPr>
         <p:spPr>
@@ -14684,7 +14882,23 @@
             </a:pPr>
             <a:r>
               <a:rPr lang="fr-CA" sz="1800" dirty="0" smtClean="0"/>
-              <a:t>Modéliser hacheur 4 quadrants simplifié à 4 interrupteurs (préliminaire)</a:t>
+              <a:t>Modéliser </a:t>
+            </a:r>
+            <a:r>
+              <a:rPr lang="fr-CA" sz="1800" dirty="0" smtClean="0"/>
+              <a:t>hacheur </a:t>
+            </a:r>
+            <a:r>
+              <a:rPr lang="fr-CA" sz="1800" dirty="0" smtClean="0"/>
+              <a:t>4 quadrants </a:t>
+            </a:r>
+            <a:r>
+              <a:rPr lang="fr-CA" sz="1800" dirty="0" smtClean="0"/>
+              <a:t>simplifié </a:t>
+            </a:r>
+            <a:r>
+              <a:rPr lang="fr-CA" sz="1800" dirty="0" smtClean="0"/>
+              <a:t>à 4 interrupteurs (préliminaire)</a:t>
             </a:r>
           </a:p>
           <a:p>
@@ -14694,7 +14908,19 @@
             </a:pPr>
             <a:r>
               <a:rPr lang="fr-CA" sz="1800" dirty="0"/>
-              <a:t>Modéliser hacheur 4 quadrants </a:t>
+              <a:t>Modéliser </a:t>
+            </a:r>
+            <a:r>
+              <a:rPr lang="fr-CA" sz="1800" dirty="0" smtClean="0"/>
+              <a:t>hacheur </a:t>
+            </a:r>
+            <a:r>
+              <a:rPr lang="fr-CA" sz="1800" dirty="0"/>
+              <a:t>4 </a:t>
+            </a:r>
+            <a:r>
+              <a:rPr lang="fr-CA" sz="1800" dirty="0" smtClean="0"/>
+              <a:t>quadrants </a:t>
             </a:r>
             <a:r>
               <a:rPr lang="fr-CA" sz="1800" dirty="0" smtClean="0"/>
@@ -14732,7 +14958,15 @@
             </a:pPr>
             <a:r>
               <a:rPr lang="fr-CA" sz="1800" dirty="0"/>
-              <a:t>Modélisation simplifiée entrée hacheur 4 quadrants </a:t>
+              <a:t>Modélisation simplifiée </a:t>
+            </a:r>
+            <a:r>
+              <a:rPr lang="fr-CA" sz="1800" dirty="0" smtClean="0"/>
+              <a:t>entrée hacheur </a:t>
+            </a:r>
+            <a:r>
+              <a:rPr lang="fr-CA" sz="1800" dirty="0"/>
+              <a:t>4 quadrants </a:t>
             </a:r>
             <a:r>
               <a:rPr lang="fr-CA" sz="1800" dirty="0" smtClean="0"/>
@@ -14892,6 +15126,9 @@
           </p:cNvSpPr>
           <p:nvPr>
             <p:ph type="title"/>
+            <p:custDataLst>
+              <p:tags r:id="rId1"/>
+            </p:custDataLst>
           </p:nvPr>
         </p:nvSpPr>
         <p:spPr>
@@ -14920,6 +15157,9 @@
           </p:cNvSpPr>
           <p:nvPr>
             <p:ph idx="1"/>
+            <p:custDataLst>
+              <p:tags r:id="rId2"/>
+            </p:custDataLst>
           </p:nvPr>
         </p:nvSpPr>
         <p:spPr>
@@ -15091,6 +15331,9 @@
           </p:cNvSpPr>
           <p:nvPr>
             <p:ph type="title"/>
+            <p:custDataLst>
+              <p:tags r:id="rId1"/>
+            </p:custDataLst>
           </p:nvPr>
         </p:nvSpPr>
         <p:spPr>
@@ -15173,6 +15416,9 @@
           </p:cNvSpPr>
           <p:nvPr>
             <p:ph idx="1"/>
+            <p:custDataLst>
+              <p:tags r:id="rId2"/>
+            </p:custDataLst>
           </p:nvPr>
         </p:nvSpPr>
         <p:spPr>
@@ -15239,7 +15485,11 @@
         <p:nvGrpSpPr>
           <p:cNvPr id="11" name="Group 10"/>
           <p:cNvGrpSpPr/>
-          <p:nvPr/>
+          <p:nvPr>
+            <p:custDataLst>
+              <p:tags r:id="rId3"/>
+            </p:custDataLst>
+          </p:nvPr>
         </p:nvGrpSpPr>
         <p:grpSpPr>
           <a:xfrm>
@@ -15258,7 +15508,7 @@
             <p:nvPr/>
           </p:nvPicPr>
           <p:blipFill rotWithShape="1">
-            <a:blip r:embed="rId2"/>
+            <a:blip r:embed="rId6"/>
             <a:srcRect l="37070" t="57967" r="27391" b="499"/>
             <a:stretch/>
           </p:blipFill>
@@ -15429,7 +15679,11 @@
           <p:cNvSpPr txBox="1">
             <a:spLocks/>
           </p:cNvSpPr>
-          <p:nvPr/>
+          <p:nvPr>
+            <p:custDataLst>
+              <p:tags r:id="rId4"/>
+            </p:custDataLst>
+          </p:nvPr>
         </p:nvSpPr>
         <p:spPr>
           <a:xfrm>
@@ -15840,7 +16094,11 @@
         <p:nvSpPr>
           <p:cNvPr id="6" name="TextBox 5"/>
           <p:cNvSpPr txBox="1"/>
-          <p:nvPr/>
+          <p:nvPr>
+            <p:custDataLst>
+              <p:tags r:id="rId1"/>
+            </p:custDataLst>
+          </p:nvPr>
         </p:nvSpPr>
         <p:spPr>
           <a:xfrm>
@@ -15920,6 +16178,9 @@
           </p:cNvSpPr>
           <p:nvPr>
             <p:ph type="title"/>
+            <p:custDataLst>
+              <p:tags r:id="rId2"/>
+            </p:custDataLst>
           </p:nvPr>
         </p:nvSpPr>
         <p:spPr>
@@ -15968,10 +16229,14 @@
           <p:cNvPicPr>
             <a:picLocks noChangeAspect="1"/>
           </p:cNvPicPr>
-          <p:nvPr/>
+          <p:nvPr>
+            <p:custDataLst>
+              <p:tags r:id="rId3"/>
+            </p:custDataLst>
+          </p:nvPr>
         </p:nvPicPr>
         <p:blipFill>
-          <a:blip r:embed="rId2">
+          <a:blip r:embed="rId8">
             <a:extLst>
               <a:ext uri="{28A0092B-C50C-407E-A947-70E740481C1C}">
                 <a14:useLocalDpi xmlns:a14="http://schemas.microsoft.com/office/drawing/2010/main" val="0"/>
@@ -15998,10 +16263,14 @@
           <p:cNvPicPr>
             <a:picLocks noChangeAspect="1"/>
           </p:cNvPicPr>
-          <p:nvPr/>
+          <p:nvPr>
+            <p:custDataLst>
+              <p:tags r:id="rId4"/>
+            </p:custDataLst>
+          </p:nvPr>
         </p:nvPicPr>
         <p:blipFill>
-          <a:blip r:embed="rId3">
+          <a:blip r:embed="rId9">
             <a:extLst>
               <a:ext uri="{28A0092B-C50C-407E-A947-70E740481C1C}">
                 <a14:useLocalDpi xmlns:a14="http://schemas.microsoft.com/office/drawing/2010/main" val="0"/>
@@ -16026,7 +16295,11 @@
         <p:nvSpPr>
           <p:cNvPr id="3" name="Rectangle 2"/>
           <p:cNvSpPr/>
-          <p:nvPr/>
+          <p:nvPr>
+            <p:custDataLst>
+              <p:tags r:id="rId5"/>
+            </p:custDataLst>
+          </p:nvPr>
         </p:nvSpPr>
         <p:spPr>
           <a:xfrm>
@@ -16071,7 +16344,11 @@
         <p:nvSpPr>
           <p:cNvPr id="8" name="Rectangle 7"/>
           <p:cNvSpPr/>
-          <p:nvPr/>
+          <p:nvPr>
+            <p:custDataLst>
+              <p:tags r:id="rId6"/>
+            </p:custDataLst>
+          </p:nvPr>
         </p:nvSpPr>
         <p:spPr>
           <a:xfrm>
@@ -16151,6 +16428,9 @@
           </p:cNvSpPr>
           <p:nvPr>
             <p:ph type="title"/>
+            <p:custDataLst>
+              <p:tags r:id="rId1"/>
+            </p:custDataLst>
           </p:nvPr>
         </p:nvSpPr>
         <p:spPr>
@@ -16190,10 +16470,14 @@
           <p:cNvPicPr>
             <a:picLocks noChangeAspect="1"/>
           </p:cNvPicPr>
-          <p:nvPr/>
+          <p:nvPr>
+            <p:custDataLst>
+              <p:tags r:id="rId2"/>
+            </p:custDataLst>
+          </p:nvPr>
         </p:nvPicPr>
         <p:blipFill>
-          <a:blip r:embed="rId2">
+          <a:blip r:embed="rId5">
             <a:extLst>
               <a:ext uri="{28A0092B-C50C-407E-A947-70E740481C1C}">
                 <a14:useLocalDpi xmlns:a14="http://schemas.microsoft.com/office/drawing/2010/main" val="0"/>
@@ -16220,10 +16504,14 @@
           <p:cNvPicPr>
             <a:picLocks noChangeAspect="1"/>
           </p:cNvPicPr>
-          <p:nvPr/>
+          <p:nvPr>
+            <p:custDataLst>
+              <p:tags r:id="rId3"/>
+            </p:custDataLst>
+          </p:nvPr>
         </p:nvPicPr>
         <p:blipFill>
-          <a:blip r:embed="rId3">
+          <a:blip r:embed="rId6">
             <a:extLst>
               <a:ext uri="{28A0092B-C50C-407E-A947-70E740481C1C}">
                 <a14:useLocalDpi xmlns:a14="http://schemas.microsoft.com/office/drawing/2010/main" val="0"/>
@@ -16289,6 +16577,9 @@
           </p:cNvSpPr>
           <p:nvPr>
             <p:ph type="title"/>
+            <p:custDataLst>
+              <p:tags r:id="rId1"/>
+            </p:custDataLst>
           </p:nvPr>
         </p:nvSpPr>
         <p:spPr/>
@@ -16317,10 +16608,14 @@
           <p:cNvPicPr>
             <a:picLocks noChangeAspect="1" noChangeArrowheads="1"/>
           </p:cNvPicPr>
-          <p:nvPr/>
+          <p:nvPr>
+            <p:custDataLst>
+              <p:tags r:id="rId2"/>
+            </p:custDataLst>
+          </p:nvPr>
         </p:nvPicPr>
         <p:blipFill>
-          <a:blip r:embed="rId2">
+          <a:blip r:embed="rId5">
             <a:extLst>
               <a:ext uri="{28A0092B-C50C-407E-A947-70E740481C1C}">
                 <a14:useLocalDpi xmlns:a14="http://schemas.microsoft.com/office/drawing/2010/main" val="0"/>
@@ -16370,10 +16665,14 @@
           <p:cNvPicPr>
             <a:picLocks noChangeAspect="1"/>
           </p:cNvPicPr>
-          <p:nvPr/>
+          <p:nvPr>
+            <p:custDataLst>
+              <p:tags r:id="rId3"/>
+            </p:custDataLst>
+          </p:nvPr>
         </p:nvPicPr>
         <p:blipFill>
-          <a:blip r:embed="rId3">
+          <a:blip r:embed="rId6">
             <a:extLst>
               <a:ext uri="{28A0092B-C50C-407E-A947-70E740481C1C}">
                 <a14:useLocalDpi xmlns:a14="http://schemas.microsoft.com/office/drawing/2010/main" val="0"/>
@@ -16420,9 +16719,435 @@
 </p:tagLst>
 </file>
 
+<file path=ppt/tags/tag10.xml><?xml version="1.0" encoding="utf-8"?>
+<p:tagLst xmlns:a="http://schemas.openxmlformats.org/drawingml/2006/main" xmlns:r="http://schemas.openxmlformats.org/officeDocument/2006/relationships" xmlns:p="http://schemas.openxmlformats.org/presentationml/2006/main">
+  <p:tag name="NUM" val="2"/>
+</p:tagLst>
+</file>
+
+<file path=ppt/tags/tag11.xml><?xml version="1.0" encoding="utf-8"?>
+<p:tagLst xmlns:a="http://schemas.openxmlformats.org/drawingml/2006/main" xmlns:r="http://schemas.openxmlformats.org/officeDocument/2006/relationships" xmlns:p="http://schemas.openxmlformats.org/presentationml/2006/main">
+  <p:tag name="NUM" val="1"/>
+</p:tagLst>
+</file>
+
+<file path=ppt/tags/tag12.xml><?xml version="1.0" encoding="utf-8"?>
+<p:tagLst xmlns:a="http://schemas.openxmlformats.org/drawingml/2006/main" xmlns:r="http://schemas.openxmlformats.org/officeDocument/2006/relationships" xmlns:p="http://schemas.openxmlformats.org/presentationml/2006/main">
+  <p:tag name="NUM" val="2"/>
+</p:tagLst>
+</file>
+
+<file path=ppt/tags/tag13.xml><?xml version="1.0" encoding="utf-8"?>
+<p:tagLst xmlns:a="http://schemas.openxmlformats.org/drawingml/2006/main" xmlns:r="http://schemas.openxmlformats.org/officeDocument/2006/relationships" xmlns:p="http://schemas.openxmlformats.org/presentationml/2006/main">
+  <p:tag name="NUM" val="1"/>
+</p:tagLst>
+</file>
+
+<file path=ppt/tags/tag14.xml><?xml version="1.0" encoding="utf-8"?>
+<p:tagLst xmlns:a="http://schemas.openxmlformats.org/drawingml/2006/main" xmlns:r="http://schemas.openxmlformats.org/officeDocument/2006/relationships" xmlns:p="http://schemas.openxmlformats.org/presentationml/2006/main">
+  <p:tag name="NUM" val="2"/>
+</p:tagLst>
+</file>
+
+<file path=ppt/tags/tag15.xml><?xml version="1.0" encoding="utf-8"?>
+<p:tagLst xmlns:a="http://schemas.openxmlformats.org/drawingml/2006/main" xmlns:r="http://schemas.openxmlformats.org/officeDocument/2006/relationships" xmlns:p="http://schemas.openxmlformats.org/presentationml/2006/main">
+  <p:tag name="NUM" val="1"/>
+</p:tagLst>
+</file>
+
+<file path=ppt/tags/tag16.xml><?xml version="1.0" encoding="utf-8"?>
+<p:tagLst xmlns:a="http://schemas.openxmlformats.org/drawingml/2006/main" xmlns:r="http://schemas.openxmlformats.org/officeDocument/2006/relationships" xmlns:p="http://schemas.openxmlformats.org/presentationml/2006/main">
+  <p:tag name="NUM" val="2"/>
+</p:tagLst>
+</file>
+
+<file path=ppt/tags/tag17.xml><?xml version="1.0" encoding="utf-8"?>
+<p:tagLst xmlns:a="http://schemas.openxmlformats.org/drawingml/2006/main" xmlns:r="http://schemas.openxmlformats.org/officeDocument/2006/relationships" xmlns:p="http://schemas.openxmlformats.org/presentationml/2006/main">
+  <p:tag name="NUM" val="3"/>
+</p:tagLst>
+</file>
+
+<file path=ppt/tags/tag18.xml><?xml version="1.0" encoding="utf-8"?>
+<p:tagLst xmlns:a="http://schemas.openxmlformats.org/drawingml/2006/main" xmlns:r="http://schemas.openxmlformats.org/officeDocument/2006/relationships" xmlns:p="http://schemas.openxmlformats.org/presentationml/2006/main">
+  <p:tag name="NUM" val="4"/>
+</p:tagLst>
+</file>
+
+<file path=ppt/tags/tag19.xml><?xml version="1.0" encoding="utf-8"?>
+<p:tagLst xmlns:a="http://schemas.openxmlformats.org/drawingml/2006/main" xmlns:r="http://schemas.openxmlformats.org/officeDocument/2006/relationships" xmlns:p="http://schemas.openxmlformats.org/presentationml/2006/main">
+  <p:tag name="NUM" val="1"/>
+</p:tagLst>
+</file>
+
 <file path=ppt/tags/tag2.xml><?xml version="1.0" encoding="utf-8"?>
 <p:tagLst xmlns:a="http://schemas.openxmlformats.org/drawingml/2006/main" xmlns:r="http://schemas.openxmlformats.org/officeDocument/2006/relationships" xmlns:p="http://schemas.openxmlformats.org/presentationml/2006/main">
   <p:tag name="NUM" val="2"/>
+</p:tagLst>
+</file>
+
+<file path=ppt/tags/tag20.xml><?xml version="1.0" encoding="utf-8"?>
+<p:tagLst xmlns:a="http://schemas.openxmlformats.org/drawingml/2006/main" xmlns:r="http://schemas.openxmlformats.org/officeDocument/2006/relationships" xmlns:p="http://schemas.openxmlformats.org/presentationml/2006/main">
+  <p:tag name="NUM" val="2"/>
+</p:tagLst>
+</file>
+
+<file path=ppt/tags/tag21.xml><?xml version="1.0" encoding="utf-8"?>
+<p:tagLst xmlns:a="http://schemas.openxmlformats.org/drawingml/2006/main" xmlns:r="http://schemas.openxmlformats.org/officeDocument/2006/relationships" xmlns:p="http://schemas.openxmlformats.org/presentationml/2006/main">
+  <p:tag name="NUM" val="3"/>
+</p:tagLst>
+</file>
+
+<file path=ppt/tags/tag22.xml><?xml version="1.0" encoding="utf-8"?>
+<p:tagLst xmlns:a="http://schemas.openxmlformats.org/drawingml/2006/main" xmlns:r="http://schemas.openxmlformats.org/officeDocument/2006/relationships" xmlns:p="http://schemas.openxmlformats.org/presentationml/2006/main">
+  <p:tag name="NUM" val="4"/>
+</p:tagLst>
+</file>
+
+<file path=ppt/tags/tag23.xml><?xml version="1.0" encoding="utf-8"?>
+<p:tagLst xmlns:a="http://schemas.openxmlformats.org/drawingml/2006/main" xmlns:r="http://schemas.openxmlformats.org/officeDocument/2006/relationships" xmlns:p="http://schemas.openxmlformats.org/presentationml/2006/main">
+  <p:tag name="NUM" val="5"/>
+</p:tagLst>
+</file>
+
+<file path=ppt/tags/tag24.xml><?xml version="1.0" encoding="utf-8"?>
+<p:tagLst xmlns:a="http://schemas.openxmlformats.org/drawingml/2006/main" xmlns:r="http://schemas.openxmlformats.org/officeDocument/2006/relationships" xmlns:p="http://schemas.openxmlformats.org/presentationml/2006/main">
+  <p:tag name="NUM" val="6"/>
+</p:tagLst>
+</file>
+
+<file path=ppt/tags/tag25.xml><?xml version="1.0" encoding="utf-8"?>
+<p:tagLst xmlns:a="http://schemas.openxmlformats.org/drawingml/2006/main" xmlns:r="http://schemas.openxmlformats.org/officeDocument/2006/relationships" xmlns:p="http://schemas.openxmlformats.org/presentationml/2006/main">
+  <p:tag name="NUM" val="1"/>
+</p:tagLst>
+</file>
+
+<file path=ppt/tags/tag26.xml><?xml version="1.0" encoding="utf-8"?>
+<p:tagLst xmlns:a="http://schemas.openxmlformats.org/drawingml/2006/main" xmlns:r="http://schemas.openxmlformats.org/officeDocument/2006/relationships" xmlns:p="http://schemas.openxmlformats.org/presentationml/2006/main">
+  <p:tag name="NUM" val="2"/>
+</p:tagLst>
+</file>
+
+<file path=ppt/tags/tag27.xml><?xml version="1.0" encoding="utf-8"?>
+<p:tagLst xmlns:a="http://schemas.openxmlformats.org/drawingml/2006/main" xmlns:r="http://schemas.openxmlformats.org/officeDocument/2006/relationships" xmlns:p="http://schemas.openxmlformats.org/presentationml/2006/main">
+  <p:tag name="NUM" val="3"/>
+</p:tagLst>
+</file>
+
+<file path=ppt/tags/tag28.xml><?xml version="1.0" encoding="utf-8"?>
+<p:tagLst xmlns:a="http://schemas.openxmlformats.org/drawingml/2006/main" xmlns:r="http://schemas.openxmlformats.org/officeDocument/2006/relationships" xmlns:p="http://schemas.openxmlformats.org/presentationml/2006/main">
+  <p:tag name="NUM" val="1"/>
+</p:tagLst>
+</file>
+
+<file path=ppt/tags/tag29.xml><?xml version="1.0" encoding="utf-8"?>
+<p:tagLst xmlns:a="http://schemas.openxmlformats.org/drawingml/2006/main" xmlns:r="http://schemas.openxmlformats.org/officeDocument/2006/relationships" xmlns:p="http://schemas.openxmlformats.org/presentationml/2006/main">
+  <p:tag name="NUM" val="2"/>
+</p:tagLst>
+</file>
+
+<file path=ppt/tags/tag3.xml><?xml version="1.0" encoding="utf-8"?>
+<p:tagLst xmlns:a="http://schemas.openxmlformats.org/drawingml/2006/main" xmlns:r="http://schemas.openxmlformats.org/officeDocument/2006/relationships" xmlns:p="http://schemas.openxmlformats.org/presentationml/2006/main">
+  <p:tag name="NUM" val="1"/>
+</p:tagLst>
+</file>
+
+<file path=ppt/tags/tag30.xml><?xml version="1.0" encoding="utf-8"?>
+<p:tagLst xmlns:a="http://schemas.openxmlformats.org/drawingml/2006/main" xmlns:r="http://schemas.openxmlformats.org/officeDocument/2006/relationships" xmlns:p="http://schemas.openxmlformats.org/presentationml/2006/main">
+  <p:tag name="NUM" val="3"/>
+</p:tagLst>
+</file>
+
+<file path=ppt/tags/tag31.xml><?xml version="1.0" encoding="utf-8"?>
+<p:tagLst xmlns:a="http://schemas.openxmlformats.org/drawingml/2006/main" xmlns:r="http://schemas.openxmlformats.org/officeDocument/2006/relationships" xmlns:p="http://schemas.openxmlformats.org/presentationml/2006/main">
+  <p:tag name="NUM" val="1"/>
+</p:tagLst>
+</file>
+
+<file path=ppt/tags/tag32.xml><?xml version="1.0" encoding="utf-8"?>
+<p:tagLst xmlns:a="http://schemas.openxmlformats.org/drawingml/2006/main" xmlns:r="http://schemas.openxmlformats.org/officeDocument/2006/relationships" xmlns:p="http://schemas.openxmlformats.org/presentationml/2006/main">
+  <p:tag name="NUM" val="2"/>
+</p:tagLst>
+</file>
+
+<file path=ppt/tags/tag33.xml><?xml version="1.0" encoding="utf-8"?>
+<p:tagLst xmlns:a="http://schemas.openxmlformats.org/drawingml/2006/main" xmlns:r="http://schemas.openxmlformats.org/officeDocument/2006/relationships" xmlns:p="http://schemas.openxmlformats.org/presentationml/2006/main">
+  <p:tag name="NUM" val="3"/>
+</p:tagLst>
+</file>
+
+<file path=ppt/tags/tag34.xml><?xml version="1.0" encoding="utf-8"?>
+<p:tagLst xmlns:a="http://schemas.openxmlformats.org/drawingml/2006/main" xmlns:r="http://schemas.openxmlformats.org/officeDocument/2006/relationships" xmlns:p="http://schemas.openxmlformats.org/presentationml/2006/main">
+  <p:tag name="NUM" val="1"/>
+</p:tagLst>
+</file>
+
+<file path=ppt/tags/tag35.xml><?xml version="1.0" encoding="utf-8"?>
+<p:tagLst xmlns:a="http://schemas.openxmlformats.org/drawingml/2006/main" xmlns:r="http://schemas.openxmlformats.org/officeDocument/2006/relationships" xmlns:p="http://schemas.openxmlformats.org/presentationml/2006/main">
+  <p:tag name="NUM" val="2"/>
+</p:tagLst>
+</file>
+
+<file path=ppt/tags/tag36.xml><?xml version="1.0" encoding="utf-8"?>
+<p:tagLst xmlns:a="http://schemas.openxmlformats.org/drawingml/2006/main" xmlns:r="http://schemas.openxmlformats.org/officeDocument/2006/relationships" xmlns:p="http://schemas.openxmlformats.org/presentationml/2006/main">
+  <p:tag name="NUM" val="1"/>
+</p:tagLst>
+</file>
+
+<file path=ppt/tags/tag37.xml><?xml version="1.0" encoding="utf-8"?>
+<p:tagLst xmlns:a="http://schemas.openxmlformats.org/drawingml/2006/main" xmlns:r="http://schemas.openxmlformats.org/officeDocument/2006/relationships" xmlns:p="http://schemas.openxmlformats.org/presentationml/2006/main">
+  <p:tag name="NUM" val="2"/>
+</p:tagLst>
+</file>
+
+<file path=ppt/tags/tag38.xml><?xml version="1.0" encoding="utf-8"?>
+<p:tagLst xmlns:a="http://schemas.openxmlformats.org/drawingml/2006/main" xmlns:r="http://schemas.openxmlformats.org/officeDocument/2006/relationships" xmlns:p="http://schemas.openxmlformats.org/presentationml/2006/main">
+  <p:tag name="NUM" val="1"/>
+</p:tagLst>
+</file>
+
+<file path=ppt/tags/tag39.xml><?xml version="1.0" encoding="utf-8"?>
+<p:tagLst xmlns:a="http://schemas.openxmlformats.org/drawingml/2006/main" xmlns:r="http://schemas.openxmlformats.org/officeDocument/2006/relationships" xmlns:p="http://schemas.openxmlformats.org/presentationml/2006/main">
+  <p:tag name="NUM" val="2"/>
+</p:tagLst>
+</file>
+
+<file path=ppt/tags/tag4.xml><?xml version="1.0" encoding="utf-8"?>
+<p:tagLst xmlns:a="http://schemas.openxmlformats.org/drawingml/2006/main" xmlns:r="http://schemas.openxmlformats.org/officeDocument/2006/relationships" xmlns:p="http://schemas.openxmlformats.org/presentationml/2006/main">
+  <p:tag name="NUM" val="2"/>
+</p:tagLst>
+</file>
+
+<file path=ppt/tags/tag40.xml><?xml version="1.0" encoding="utf-8"?>
+<p:tagLst xmlns:a="http://schemas.openxmlformats.org/drawingml/2006/main" xmlns:r="http://schemas.openxmlformats.org/officeDocument/2006/relationships" xmlns:p="http://schemas.openxmlformats.org/presentationml/2006/main">
+  <p:tag name="NUM" val="1"/>
+</p:tagLst>
+</file>
+
+<file path=ppt/tags/tag41.xml><?xml version="1.0" encoding="utf-8"?>
+<p:tagLst xmlns:a="http://schemas.openxmlformats.org/drawingml/2006/main" xmlns:r="http://schemas.openxmlformats.org/officeDocument/2006/relationships" xmlns:p="http://schemas.openxmlformats.org/presentationml/2006/main">
+  <p:tag name="NUM" val="2"/>
+</p:tagLst>
+</file>
+
+<file path=ppt/tags/tag42.xml><?xml version="1.0" encoding="utf-8"?>
+<p:tagLst xmlns:a="http://schemas.openxmlformats.org/drawingml/2006/main" xmlns:r="http://schemas.openxmlformats.org/officeDocument/2006/relationships" xmlns:p="http://schemas.openxmlformats.org/presentationml/2006/main">
+  <p:tag name="NUM" val="1"/>
+</p:tagLst>
+</file>
+
+<file path=ppt/tags/tag43.xml><?xml version="1.0" encoding="utf-8"?>
+<p:tagLst xmlns:a="http://schemas.openxmlformats.org/drawingml/2006/main" xmlns:r="http://schemas.openxmlformats.org/officeDocument/2006/relationships" xmlns:p="http://schemas.openxmlformats.org/presentationml/2006/main">
+  <p:tag name="NUM" val="2"/>
+</p:tagLst>
+</file>
+
+<file path=ppt/tags/tag44.xml><?xml version="1.0" encoding="utf-8"?>
+<p:tagLst xmlns:a="http://schemas.openxmlformats.org/drawingml/2006/main" xmlns:r="http://schemas.openxmlformats.org/officeDocument/2006/relationships" xmlns:p="http://schemas.openxmlformats.org/presentationml/2006/main">
+  <p:tag name="NUM" val="3"/>
+</p:tagLst>
+</file>
+
+<file path=ppt/tags/tag45.xml><?xml version="1.0" encoding="utf-8"?>
+<p:tagLst xmlns:a="http://schemas.openxmlformats.org/drawingml/2006/main" xmlns:r="http://schemas.openxmlformats.org/officeDocument/2006/relationships" xmlns:p="http://schemas.openxmlformats.org/presentationml/2006/main">
+  <p:tag name="NUM" val="1"/>
+</p:tagLst>
+</file>
+
+<file path=ppt/tags/tag46.xml><?xml version="1.0" encoding="utf-8"?>
+<p:tagLst xmlns:a="http://schemas.openxmlformats.org/drawingml/2006/main" xmlns:r="http://schemas.openxmlformats.org/officeDocument/2006/relationships" xmlns:p="http://schemas.openxmlformats.org/presentationml/2006/main">
+  <p:tag name="NUM" val="2"/>
+</p:tagLst>
+</file>
+
+<file path=ppt/tags/tag47.xml><?xml version="1.0" encoding="utf-8"?>
+<p:tagLst xmlns:a="http://schemas.openxmlformats.org/drawingml/2006/main" xmlns:r="http://schemas.openxmlformats.org/officeDocument/2006/relationships" xmlns:p="http://schemas.openxmlformats.org/presentationml/2006/main">
+  <p:tag name="NUM" val="1"/>
+</p:tagLst>
+</file>
+
+<file path=ppt/tags/tag48.xml><?xml version="1.0" encoding="utf-8"?>
+<p:tagLst xmlns:a="http://schemas.openxmlformats.org/drawingml/2006/main" xmlns:r="http://schemas.openxmlformats.org/officeDocument/2006/relationships" xmlns:p="http://schemas.openxmlformats.org/presentationml/2006/main">
+  <p:tag name="NUM" val="2"/>
+</p:tagLst>
+</file>
+
+<file path=ppt/tags/tag49.xml><?xml version="1.0" encoding="utf-8"?>
+<p:tagLst xmlns:a="http://schemas.openxmlformats.org/drawingml/2006/main" xmlns:r="http://schemas.openxmlformats.org/officeDocument/2006/relationships" xmlns:p="http://schemas.openxmlformats.org/presentationml/2006/main">
+  <p:tag name="NUM" val="1"/>
+</p:tagLst>
+</file>
+
+<file path=ppt/tags/tag5.xml><?xml version="1.0" encoding="utf-8"?>
+<p:tagLst xmlns:a="http://schemas.openxmlformats.org/drawingml/2006/main" xmlns:r="http://schemas.openxmlformats.org/officeDocument/2006/relationships" xmlns:p="http://schemas.openxmlformats.org/presentationml/2006/main">
+  <p:tag name="NUM" val="3"/>
+</p:tagLst>
+</file>
+
+<file path=ppt/tags/tag50.xml><?xml version="1.0" encoding="utf-8"?>
+<p:tagLst xmlns:a="http://schemas.openxmlformats.org/drawingml/2006/main" xmlns:r="http://schemas.openxmlformats.org/officeDocument/2006/relationships" xmlns:p="http://schemas.openxmlformats.org/presentationml/2006/main">
+  <p:tag name="NUM" val="2"/>
+</p:tagLst>
+</file>
+
+<file path=ppt/tags/tag51.xml><?xml version="1.0" encoding="utf-8"?>
+<p:tagLst xmlns:a="http://schemas.openxmlformats.org/drawingml/2006/main" xmlns:r="http://schemas.openxmlformats.org/officeDocument/2006/relationships" xmlns:p="http://schemas.openxmlformats.org/presentationml/2006/main">
+  <p:tag name="NUM" val="3"/>
+</p:tagLst>
+</file>
+
+<file path=ppt/tags/tag52.xml><?xml version="1.0" encoding="utf-8"?>
+<p:tagLst xmlns:a="http://schemas.openxmlformats.org/drawingml/2006/main" xmlns:r="http://schemas.openxmlformats.org/officeDocument/2006/relationships" xmlns:p="http://schemas.openxmlformats.org/presentationml/2006/main">
+  <p:tag name="NUM" val="1"/>
+</p:tagLst>
+</file>
+
+<file path=ppt/tags/tag53.xml><?xml version="1.0" encoding="utf-8"?>
+<p:tagLst xmlns:a="http://schemas.openxmlformats.org/drawingml/2006/main" xmlns:r="http://schemas.openxmlformats.org/officeDocument/2006/relationships" xmlns:p="http://schemas.openxmlformats.org/presentationml/2006/main">
+  <p:tag name="NUM" val="2"/>
+</p:tagLst>
+</file>
+
+<file path=ppt/tags/tag54.xml><?xml version="1.0" encoding="utf-8"?>
+<p:tagLst xmlns:a="http://schemas.openxmlformats.org/drawingml/2006/main" xmlns:r="http://schemas.openxmlformats.org/officeDocument/2006/relationships" xmlns:p="http://schemas.openxmlformats.org/presentationml/2006/main">
+  <p:tag name="NUM" val="1"/>
+</p:tagLst>
+</file>
+
+<file path=ppt/tags/tag55.xml><?xml version="1.0" encoding="utf-8"?>
+<p:tagLst xmlns:a="http://schemas.openxmlformats.org/drawingml/2006/main" xmlns:r="http://schemas.openxmlformats.org/officeDocument/2006/relationships" xmlns:p="http://schemas.openxmlformats.org/presentationml/2006/main">
+  <p:tag name="NUM" val="2"/>
+</p:tagLst>
+</file>
+
+<file path=ppt/tags/tag56.xml><?xml version="1.0" encoding="utf-8"?>
+<p:tagLst xmlns:a="http://schemas.openxmlformats.org/drawingml/2006/main" xmlns:r="http://schemas.openxmlformats.org/officeDocument/2006/relationships" xmlns:p="http://schemas.openxmlformats.org/presentationml/2006/main">
+  <p:tag name="NUM" val="1"/>
+</p:tagLst>
+</file>
+
+<file path=ppt/tags/tag57.xml><?xml version="1.0" encoding="utf-8"?>
+<p:tagLst xmlns:a="http://schemas.openxmlformats.org/drawingml/2006/main" xmlns:r="http://schemas.openxmlformats.org/officeDocument/2006/relationships" xmlns:p="http://schemas.openxmlformats.org/presentationml/2006/main">
+  <p:tag name="NUM" val="2"/>
+</p:tagLst>
+</file>
+
+<file path=ppt/tags/tag58.xml><?xml version="1.0" encoding="utf-8"?>
+<p:tagLst xmlns:a="http://schemas.openxmlformats.org/drawingml/2006/main" xmlns:r="http://schemas.openxmlformats.org/officeDocument/2006/relationships" xmlns:p="http://schemas.openxmlformats.org/presentationml/2006/main">
+  <p:tag name="NUM" val="1"/>
+</p:tagLst>
+</file>
+
+<file path=ppt/tags/tag59.xml><?xml version="1.0" encoding="utf-8"?>
+<p:tagLst xmlns:a="http://schemas.openxmlformats.org/drawingml/2006/main" xmlns:r="http://schemas.openxmlformats.org/officeDocument/2006/relationships" xmlns:p="http://schemas.openxmlformats.org/presentationml/2006/main">
+  <p:tag name="NUM" val="2"/>
+</p:tagLst>
+</file>
+
+<file path=ppt/tags/tag6.xml><?xml version="1.0" encoding="utf-8"?>
+<p:tagLst xmlns:a="http://schemas.openxmlformats.org/drawingml/2006/main" xmlns:r="http://schemas.openxmlformats.org/officeDocument/2006/relationships" xmlns:p="http://schemas.openxmlformats.org/presentationml/2006/main">
+  <p:tag name="NUM" val="4"/>
+</p:tagLst>
+</file>
+
+<file path=ppt/tags/tag60.xml><?xml version="1.0" encoding="utf-8"?>
+<p:tagLst xmlns:a="http://schemas.openxmlformats.org/drawingml/2006/main" xmlns:r="http://schemas.openxmlformats.org/officeDocument/2006/relationships" xmlns:p="http://schemas.openxmlformats.org/presentationml/2006/main">
+  <p:tag name="NUM" val="1"/>
+</p:tagLst>
+</file>
+
+<file path=ppt/tags/tag61.xml><?xml version="1.0" encoding="utf-8"?>
+<p:tagLst xmlns:a="http://schemas.openxmlformats.org/drawingml/2006/main" xmlns:r="http://schemas.openxmlformats.org/officeDocument/2006/relationships" xmlns:p="http://schemas.openxmlformats.org/presentationml/2006/main">
+  <p:tag name="NUM" val="2"/>
+</p:tagLst>
+</file>
+
+<file path=ppt/tags/tag62.xml><?xml version="1.0" encoding="utf-8"?>
+<p:tagLst xmlns:a="http://schemas.openxmlformats.org/drawingml/2006/main" xmlns:r="http://schemas.openxmlformats.org/officeDocument/2006/relationships" xmlns:p="http://schemas.openxmlformats.org/presentationml/2006/main">
+  <p:tag name="NUM" val="1"/>
+</p:tagLst>
+</file>
+
+<file path=ppt/tags/tag63.xml><?xml version="1.0" encoding="utf-8"?>
+<p:tagLst xmlns:a="http://schemas.openxmlformats.org/drawingml/2006/main" xmlns:r="http://schemas.openxmlformats.org/officeDocument/2006/relationships" xmlns:p="http://schemas.openxmlformats.org/presentationml/2006/main">
+  <p:tag name="NUM" val="2"/>
+</p:tagLst>
+</file>
+
+<file path=ppt/tags/tag64.xml><?xml version="1.0" encoding="utf-8"?>
+<p:tagLst xmlns:a="http://schemas.openxmlformats.org/drawingml/2006/main" xmlns:r="http://schemas.openxmlformats.org/officeDocument/2006/relationships" xmlns:p="http://schemas.openxmlformats.org/presentationml/2006/main">
+  <p:tag name="NUM" val="1"/>
+</p:tagLst>
+</file>
+
+<file path=ppt/tags/tag65.xml><?xml version="1.0" encoding="utf-8"?>
+<p:tagLst xmlns:a="http://schemas.openxmlformats.org/drawingml/2006/main" xmlns:r="http://schemas.openxmlformats.org/officeDocument/2006/relationships" xmlns:p="http://schemas.openxmlformats.org/presentationml/2006/main">
+  <p:tag name="NUM" val="2"/>
+</p:tagLst>
+</file>
+
+<file path=ppt/tags/tag66.xml><?xml version="1.0" encoding="utf-8"?>
+<p:tagLst xmlns:a="http://schemas.openxmlformats.org/drawingml/2006/main" xmlns:r="http://schemas.openxmlformats.org/officeDocument/2006/relationships" xmlns:p="http://schemas.openxmlformats.org/presentationml/2006/main">
+  <p:tag name="NUM" val="1"/>
+</p:tagLst>
+</file>
+
+<file path=ppt/tags/tag67.xml><?xml version="1.0" encoding="utf-8"?>
+<p:tagLst xmlns:a="http://schemas.openxmlformats.org/drawingml/2006/main" xmlns:r="http://schemas.openxmlformats.org/officeDocument/2006/relationships" xmlns:p="http://schemas.openxmlformats.org/presentationml/2006/main">
+  <p:tag name="NUM" val="2"/>
+</p:tagLst>
+</file>
+
+<file path=ppt/tags/tag68.xml><?xml version="1.0" encoding="utf-8"?>
+<p:tagLst xmlns:a="http://schemas.openxmlformats.org/drawingml/2006/main" xmlns:r="http://schemas.openxmlformats.org/officeDocument/2006/relationships" xmlns:p="http://schemas.openxmlformats.org/presentationml/2006/main">
+  <p:tag name="NUM" val="1"/>
+</p:tagLst>
+</file>
+
+<file path=ppt/tags/tag69.xml><?xml version="1.0" encoding="utf-8"?>
+<p:tagLst xmlns:a="http://schemas.openxmlformats.org/drawingml/2006/main" xmlns:r="http://schemas.openxmlformats.org/officeDocument/2006/relationships" xmlns:p="http://schemas.openxmlformats.org/presentationml/2006/main">
+  <p:tag name="NUM" val="2"/>
+</p:tagLst>
+</file>
+
+<file path=ppt/tags/tag7.xml><?xml version="1.0" encoding="utf-8"?>
+<p:tagLst xmlns:a="http://schemas.openxmlformats.org/drawingml/2006/main" xmlns:r="http://schemas.openxmlformats.org/officeDocument/2006/relationships" xmlns:p="http://schemas.openxmlformats.org/presentationml/2006/main">
+  <p:tag name="NUM" val="5"/>
+</p:tagLst>
+</file>
+
+<file path=ppt/tags/tag70.xml><?xml version="1.0" encoding="utf-8"?>
+<p:tagLst xmlns:a="http://schemas.openxmlformats.org/drawingml/2006/main" xmlns:r="http://schemas.openxmlformats.org/officeDocument/2006/relationships" xmlns:p="http://schemas.openxmlformats.org/presentationml/2006/main">
+  <p:tag name="NUM" val="1"/>
+</p:tagLst>
+</file>
+
+<file path=ppt/tags/tag71.xml><?xml version="1.0" encoding="utf-8"?>
+<p:tagLst xmlns:a="http://schemas.openxmlformats.org/drawingml/2006/main" xmlns:r="http://schemas.openxmlformats.org/officeDocument/2006/relationships" xmlns:p="http://schemas.openxmlformats.org/presentationml/2006/main">
+  <p:tag name="NUM" val="2"/>
+</p:tagLst>
+</file>
+
+<file path=ppt/tags/tag72.xml><?xml version="1.0" encoding="utf-8"?>
+<p:tagLst xmlns:a="http://schemas.openxmlformats.org/drawingml/2006/main" xmlns:r="http://schemas.openxmlformats.org/officeDocument/2006/relationships" xmlns:p="http://schemas.openxmlformats.org/presentationml/2006/main">
+  <p:tag name="NUM" val="1"/>
+</p:tagLst>
+</file>
+
+<file path=ppt/tags/tag73.xml><?xml version="1.0" encoding="utf-8"?>
+<p:tagLst xmlns:a="http://schemas.openxmlformats.org/drawingml/2006/main" xmlns:r="http://schemas.openxmlformats.org/officeDocument/2006/relationships" xmlns:p="http://schemas.openxmlformats.org/presentationml/2006/main">
+  <p:tag name="NUM" val="2"/>
+</p:tagLst>
+</file>
+
+<file path=ppt/tags/tag8.xml><?xml version="1.0" encoding="utf-8"?>
+<p:tagLst xmlns:a="http://schemas.openxmlformats.org/drawingml/2006/main" xmlns:r="http://schemas.openxmlformats.org/officeDocument/2006/relationships" xmlns:p="http://schemas.openxmlformats.org/presentationml/2006/main">
+  <p:tag name="NUM" val="6"/>
+</p:tagLst>
+</file>
+
+<file path=ppt/tags/tag9.xml><?xml version="1.0" encoding="utf-8"?>
+<p:tagLst xmlns:a="http://schemas.openxmlformats.org/drawingml/2006/main" xmlns:r="http://schemas.openxmlformats.org/officeDocument/2006/relationships" xmlns:p="http://schemas.openxmlformats.org/presentationml/2006/main">
+  <p:tag name="NUM" val="1"/>
 </p:tagLst>
 </file>
 

</xml_diff>